<commit_message>
cleaned up Zoom figure
</commit_message>
<xml_diff>
--- a/figures/rpc.pptx
+++ b/figures/rpc.pptx
@@ -200,7 +200,7 @@
           <a:p>
             <a:fld id="{9E649BF4-58FE-2544-902F-4DDF88090C98}" type="datetimeFigureOut">
               <a:rPr lang="en-US" smtClean="0"/>
-              <a:t>11/5/19</a:t>
+              <a:t>11/6/19</a:t>
             </a:fld>
             <a:endParaRPr lang="en-US"/>
           </a:p>
@@ -683,7 +683,7 @@
           <a:p>
             <a:fld id="{5D97E163-DB95-D24D-8C95-263DECB1FC34}" type="datetimeFigureOut">
               <a:rPr lang="en-US" smtClean="0"/>
-              <a:t>11/5/19</a:t>
+              <a:t>11/6/19</a:t>
             </a:fld>
             <a:endParaRPr lang="en-US"/>
           </a:p>
@@ -853,7 +853,7 @@
           <a:p>
             <a:fld id="{5D97E163-DB95-D24D-8C95-263DECB1FC34}" type="datetimeFigureOut">
               <a:rPr lang="en-US" smtClean="0"/>
-              <a:t>11/5/19</a:t>
+              <a:t>11/6/19</a:t>
             </a:fld>
             <a:endParaRPr lang="en-US"/>
           </a:p>
@@ -1033,7 +1033,7 @@
           <a:p>
             <a:fld id="{5D97E163-DB95-D24D-8C95-263DECB1FC34}" type="datetimeFigureOut">
               <a:rPr lang="en-US" smtClean="0"/>
-              <a:t>11/5/19</a:t>
+              <a:t>11/6/19</a:t>
             </a:fld>
             <a:endParaRPr lang="en-US"/>
           </a:p>
@@ -1203,7 +1203,7 @@
           <a:p>
             <a:fld id="{5D97E163-DB95-D24D-8C95-263DECB1FC34}" type="datetimeFigureOut">
               <a:rPr lang="en-US" smtClean="0"/>
-              <a:t>11/5/19</a:t>
+              <a:t>11/6/19</a:t>
             </a:fld>
             <a:endParaRPr lang="en-US"/>
           </a:p>
@@ -1449,7 +1449,7 @@
           <a:p>
             <a:fld id="{5D97E163-DB95-D24D-8C95-263DECB1FC34}" type="datetimeFigureOut">
               <a:rPr lang="en-US" smtClean="0"/>
-              <a:t>11/5/19</a:t>
+              <a:t>11/6/19</a:t>
             </a:fld>
             <a:endParaRPr lang="en-US"/>
           </a:p>
@@ -1681,7 +1681,7 @@
           <a:p>
             <a:fld id="{5D97E163-DB95-D24D-8C95-263DECB1FC34}" type="datetimeFigureOut">
               <a:rPr lang="en-US" smtClean="0"/>
-              <a:t>11/5/19</a:t>
+              <a:t>11/6/19</a:t>
             </a:fld>
             <a:endParaRPr lang="en-US"/>
           </a:p>
@@ -2048,7 +2048,7 @@
           <a:p>
             <a:fld id="{5D97E163-DB95-D24D-8C95-263DECB1FC34}" type="datetimeFigureOut">
               <a:rPr lang="en-US" smtClean="0"/>
-              <a:t>11/5/19</a:t>
+              <a:t>11/6/19</a:t>
             </a:fld>
             <a:endParaRPr lang="en-US"/>
           </a:p>
@@ -2166,7 +2166,7 @@
           <a:p>
             <a:fld id="{5D97E163-DB95-D24D-8C95-263DECB1FC34}" type="datetimeFigureOut">
               <a:rPr lang="en-US" smtClean="0"/>
-              <a:t>11/5/19</a:t>
+              <a:t>11/6/19</a:t>
             </a:fld>
             <a:endParaRPr lang="en-US"/>
           </a:p>
@@ -2261,7 +2261,7 @@
           <a:p>
             <a:fld id="{5D97E163-DB95-D24D-8C95-263DECB1FC34}" type="datetimeFigureOut">
               <a:rPr lang="en-US" smtClean="0"/>
-              <a:t>11/5/19</a:t>
+              <a:t>11/6/19</a:t>
             </a:fld>
             <a:endParaRPr lang="en-US"/>
           </a:p>
@@ -2538,7 +2538,7 @@
           <a:p>
             <a:fld id="{5D97E163-DB95-D24D-8C95-263DECB1FC34}" type="datetimeFigureOut">
               <a:rPr lang="en-US" smtClean="0"/>
-              <a:t>11/5/19</a:t>
+              <a:t>11/6/19</a:t>
             </a:fld>
             <a:endParaRPr lang="en-US"/>
           </a:p>
@@ -2791,7 +2791,7 @@
           <a:p>
             <a:fld id="{5D97E163-DB95-D24D-8C95-263DECB1FC34}" type="datetimeFigureOut">
               <a:rPr lang="en-US" smtClean="0"/>
-              <a:t>11/5/19</a:t>
+              <a:t>11/6/19</a:t>
             </a:fld>
             <a:endParaRPr lang="en-US"/>
           </a:p>
@@ -3004,7 +3004,7 @@
           <a:p>
             <a:fld id="{5D97E163-DB95-D24D-8C95-263DECB1FC34}" type="datetimeFigureOut">
               <a:rPr lang="en-US" smtClean="0"/>
-              <a:t>11/5/19</a:t>
+              <a:t>11/6/19</a:t>
             </a:fld>
             <a:endParaRPr lang="en-US"/>
           </a:p>
@@ -5945,6 +5945,46 @@
           <a:chExt cx="0" cy="0"/>
         </a:xfrm>
       </p:grpSpPr>
+      <p:sp>
+        <p:nvSpPr>
+          <p:cNvPr id="5" name="Rectangle 4"/>
+          <p:cNvSpPr/>
+          <p:nvPr/>
+        </p:nvSpPr>
+        <p:spPr>
+          <a:xfrm>
+            <a:off x="609600" y="516199"/>
+            <a:ext cx="10171471" cy="5891754"/>
+          </a:xfrm>
+          <a:prstGeom prst="rect">
+            <a:avLst/>
+          </a:prstGeom>
+        </p:spPr>
+        <p:style>
+          <a:lnRef idx="2">
+            <a:schemeClr val="accent1">
+              <a:shade val="50000"/>
+            </a:schemeClr>
+          </a:lnRef>
+          <a:fillRef idx="1">
+            <a:schemeClr val="accent1"/>
+          </a:fillRef>
+          <a:effectRef idx="0">
+            <a:schemeClr val="accent1"/>
+          </a:effectRef>
+          <a:fontRef idx="minor">
+            <a:schemeClr val="lt1"/>
+          </a:fontRef>
+        </p:style>
+        <p:txBody>
+          <a:bodyPr rtlCol="0" anchor="ctr"/>
+          <a:lstStyle/>
+          <a:p>
+            <a:pPr algn="ctr"/>
+            <a:endParaRPr lang="en-US"/>
+          </a:p>
+        </p:txBody>
+      </p:sp>
       <p:pic>
         <p:nvPicPr>
           <p:cNvPr id="2" name="Picture 1"/>
@@ -5967,7 +6007,7 @@
         </p:blipFill>
         <p:spPr>
           <a:xfrm>
-            <a:off x="152400" y="0"/>
+            <a:off x="666135" y="560443"/>
             <a:ext cx="10058400" cy="5803267"/>
           </a:xfrm>
           <a:prstGeom prst="rect">
@@ -5977,7 +6017,7 @@
       </p:pic>
       <p:pic>
         <p:nvPicPr>
-          <p:cNvPr id="3" name="Picture 2"/>
+          <p:cNvPr id="4" name="Picture 3"/>
           <p:cNvPicPr>
             <a:picLocks noChangeAspect="1"/>
           </p:cNvPicPr>
@@ -5997,8 +6037,8 @@
         </p:blipFill>
         <p:spPr>
           <a:xfrm>
-            <a:off x="2344994" y="304486"/>
-            <a:ext cx="1401096" cy="786896"/>
+            <a:off x="4323735" y="843702"/>
+            <a:ext cx="1398640" cy="807557"/>
           </a:xfrm>
           <a:prstGeom prst="rect">
             <a:avLst/>
@@ -6007,7 +6047,7 @@
       </p:pic>
       <p:pic>
         <p:nvPicPr>
-          <p:cNvPr id="4" name="Picture 3"/>
+          <p:cNvPr id="7" name="Picture 6"/>
           <p:cNvPicPr>
             <a:picLocks noChangeAspect="1"/>
           </p:cNvPicPr>
@@ -6027,8 +6067,8 @@
         </p:blipFill>
         <p:spPr>
           <a:xfrm>
-            <a:off x="3834581" y="304486"/>
-            <a:ext cx="1371600" cy="786896"/>
+            <a:off x="2866513" y="867287"/>
+            <a:ext cx="1381021" cy="798721"/>
           </a:xfrm>
           <a:prstGeom prst="rect">
             <a:avLst/>

</xml_diff>